<commit_message>
#15 refactored to code to fix tqdm and also added logging system
</commit_message>
<xml_diff>
--- a/presentation/eda_presentation.pptx
+++ b/presentation/eda_presentation.pptx
@@ -21,7 +21,7 @@
     <p:sldId id="269" r:id="rId20"/>
     <p:sldId id="270" r:id="rId21"/>
   </p:sldIdLst>
-  <p:sldSz cx="12191969" cy="6858000" type="screen4x3"/>
+  <p:sldSz cx="9144000" cy="6858000" type="screen4x3"/>
   <p:notesSz cx="6858000" cy="9144000"/>
   <p:defaultTextStyle>
     <a:defPPr>
@@ -3109,7 +3109,7 @@
             <a:spLocks noGrp="1"/>
           </p:cNvSpPr>
           <p:nvPr>
-            <p:ph type="ctrTitle"/>
+            <p:ph type="title"/>
           </p:nvPr>
         </p:nvSpPr>
         <p:spPr/>
@@ -3118,34 +3118,35 @@
           <a:lstStyle/>
           <a:p>
             <a:r>
-              <a:rPr b="1"/>
-              <a:t>EXPLORATORY DATA ANALYSIS</a:t>
-            </a:r>
-          </a:p>
-        </p:txBody>
-      </p:sp>
-      <p:sp>
-        <p:nvSpPr>
-          <p:cNvPr id="3" name="Subtitle 2"/>
-          <p:cNvSpPr>
-            <a:spLocks noGrp="1"/>
-          </p:cNvSpPr>
-          <p:nvPr>
-            <p:ph type="subTitle" idx="1"/>
-          </p:nvPr>
-        </p:nvSpPr>
-        <p:spPr/>
-        <p:txBody>
-          <a:bodyPr/>
-          <a:lstStyle/>
-          <a:p>
-            <a:r>
-              <a:rPr b="1"/>
-              <a:t>MADE BY DORA</a:t>
-            </a:r>
-          </a:p>
-        </p:txBody>
-      </p:sp>
+              <a:t>Chart: bivariate_age_vs_bmi.png</a:t>
+            </a:r>
+          </a:p>
+        </p:txBody>
+      </p:sp>
+      <p:pic>
+        <p:nvPicPr>
+          <p:cNvPr id="3" name="Picture 2" descr="bivariate_age_vs_bmi.png"/>
+          <p:cNvPicPr>
+            <a:picLocks noChangeAspect="1"/>
+          </p:cNvPicPr>
+          <p:nvPr/>
+        </p:nvPicPr>
+        <p:blipFill>
+          <a:blip r:embed="rId2"/>
+          <a:stretch>
+            <a:fillRect/>
+          </a:stretch>
+        </p:blipFill>
+        <p:spPr>
+          <a:xfrm>
+            <a:off x="457200" y="457200"/>
+            <a:ext cx="7620000" cy="4572000"/>
+          </a:xfrm>
+          <a:prstGeom prst="rect">
+            <a:avLst/>
+          </a:prstGeom>
+        </p:spPr>
+      </p:pic>
     </p:spTree>
   </p:cSld>
   <p:clrMapOvr>
@@ -3180,15 +3181,14 @@
           <a:lstStyle/>
           <a:p>
             <a:r>
-              <a:rPr b="1"/>
-              <a:t>CHART - UNIVARIATE BMI</a:t>
+              <a:t>Chart: univariate_charges.png</a:t>
             </a:r>
           </a:p>
         </p:txBody>
       </p:sp>
       <p:pic>
         <p:nvPicPr>
-          <p:cNvPr id="3" name="Picture 2" descr="univariate_bmi.png"/>
+          <p:cNvPr id="3" name="Picture 2" descr="univariate_charges.png"/>
           <p:cNvPicPr>
             <a:picLocks noChangeAspect="1"/>
           </p:cNvPicPr>
@@ -3202,8 +3202,8 @@
         </p:blipFill>
         <p:spPr>
           <a:xfrm>
-            <a:off x="914400" y="1371600"/>
-            <a:ext cx="8229600" cy="4937760"/>
+            <a:off x="457200" y="457200"/>
+            <a:ext cx="7620000" cy="4572000"/>
           </a:xfrm>
           <a:prstGeom prst="rect">
             <a:avLst/>
@@ -3244,15 +3244,14 @@
           <a:lstStyle/>
           <a:p>
             <a:r>
-              <a:rPr b="1"/>
-              <a:t>CHART - UNIVARIATE CHARGES</a:t>
+              <a:t>Chart: univariate_children.png</a:t>
             </a:r>
           </a:p>
         </p:txBody>
       </p:sp>
       <p:pic>
         <p:nvPicPr>
-          <p:cNvPr id="3" name="Picture 2" descr="univariate_charges.png"/>
+          <p:cNvPr id="3" name="Picture 2" descr="univariate_children.png"/>
           <p:cNvPicPr>
             <a:picLocks noChangeAspect="1"/>
           </p:cNvPicPr>
@@ -3266,8 +3265,8 @@
         </p:blipFill>
         <p:spPr>
           <a:xfrm>
-            <a:off x="914400" y="1371600"/>
-            <a:ext cx="8229600" cy="4937760"/>
+            <a:off x="457200" y="457200"/>
+            <a:ext cx="7620000" cy="4572000"/>
           </a:xfrm>
           <a:prstGeom prst="rect">
             <a:avLst/>
@@ -3308,15 +3307,14 @@
           <a:lstStyle/>
           <a:p>
             <a:r>
-              <a:rPr b="1"/>
-              <a:t>CHART - UNIVARIATE CHILDREN</a:t>
+              <a:t>Chart: univariate_region.png</a:t>
             </a:r>
           </a:p>
         </p:txBody>
       </p:sp>
       <p:pic>
         <p:nvPicPr>
-          <p:cNvPr id="3" name="Picture 2" descr="univariate_children.png"/>
+          <p:cNvPr id="3" name="Picture 2" descr="univariate_region.png"/>
           <p:cNvPicPr>
             <a:picLocks noChangeAspect="1"/>
           </p:cNvPicPr>
@@ -3330,8 +3328,8 @@
         </p:blipFill>
         <p:spPr>
           <a:xfrm>
-            <a:off x="914400" y="1371600"/>
-            <a:ext cx="8229600" cy="4937760"/>
+            <a:off x="457200" y="457200"/>
+            <a:ext cx="7620000" cy="4572000"/>
           </a:xfrm>
           <a:prstGeom prst="rect">
             <a:avLst/>
@@ -3372,15 +3370,14 @@
           <a:lstStyle/>
           <a:p>
             <a:r>
-              <a:rPr b="1"/>
-              <a:t>CHART - UNIVARIATE REGION</a:t>
+              <a:t>Chart: univariate_sex.png</a:t>
             </a:r>
           </a:p>
         </p:txBody>
       </p:sp>
       <p:pic>
         <p:nvPicPr>
-          <p:cNvPr id="3" name="Picture 2" descr="univariate_region.png"/>
+          <p:cNvPr id="3" name="Picture 2" descr="univariate_sex.png"/>
           <p:cNvPicPr>
             <a:picLocks noChangeAspect="1"/>
           </p:cNvPicPr>
@@ -3394,8 +3391,8 @@
         </p:blipFill>
         <p:spPr>
           <a:xfrm>
-            <a:off x="914400" y="1371600"/>
-            <a:ext cx="8229600" cy="4937760"/>
+            <a:off x="457200" y="457200"/>
+            <a:ext cx="7620000" cy="4572000"/>
           </a:xfrm>
           <a:prstGeom prst="rect">
             <a:avLst/>
@@ -3436,15 +3433,14 @@
           <a:lstStyle/>
           <a:p>
             <a:r>
-              <a:rPr b="1"/>
-              <a:t>CHART - UNIVARIATE SEX</a:t>
+              <a:t>Chart: univariate_smoker.png</a:t>
             </a:r>
           </a:p>
         </p:txBody>
       </p:sp>
       <p:pic>
         <p:nvPicPr>
-          <p:cNvPr id="3" name="Picture 2" descr="univariate_sex.png"/>
+          <p:cNvPr id="3" name="Picture 2" descr="univariate_smoker.png"/>
           <p:cNvPicPr>
             <a:picLocks noChangeAspect="1"/>
           </p:cNvPicPr>
@@ -3458,8 +3454,8 @@
         </p:blipFill>
         <p:spPr>
           <a:xfrm>
-            <a:off x="914400" y="1371600"/>
-            <a:ext cx="8229600" cy="4937760"/>
+            <a:off x="457200" y="457200"/>
+            <a:ext cx="7620000" cy="4572000"/>
           </a:xfrm>
           <a:prstGeom prst="rect">
             <a:avLst/>
@@ -3499,37 +3495,1512 @@
           <a:bodyPr/>
           <a:lstStyle/>
           <a:p>
-            <a:r>
-              <a:rPr b="1"/>
-              <a:t>CHART - UNIVARIATE SMOKER</a:t>
-            </a:r>
-          </a:p>
-        </p:txBody>
-      </p:sp>
-      <p:pic>
-        <p:nvPicPr>
-          <p:cNvPr id="3" name="Picture 2" descr="univariate_smoker.png"/>
-          <p:cNvPicPr>
-            <a:picLocks noChangeAspect="1"/>
-          </p:cNvPicPr>
+            <a:pPr>
+              <a:defRPr sz="2400"/>
+            </a:pPr>
+            <a:r>
+              <a:t>Statistical Summary</a:t>
+            </a:r>
+          </a:p>
+        </p:txBody>
+      </p:sp>
+      <p:graphicFrame>
+        <p:nvGraphicFramePr>
+          <p:cNvPr id="3" name="Table 2"/>
+          <p:cNvGraphicFramePr>
+            <a:graphicFrameLocks noGrp="1"/>
+          </p:cNvGraphicFramePr>
           <p:nvPr/>
-        </p:nvPicPr>
-        <p:blipFill>
-          <a:blip r:embed="rId2"/>
-          <a:stretch>
-            <a:fillRect/>
-          </a:stretch>
-        </p:blipFill>
-        <p:spPr>
-          <a:xfrm>
-            <a:off x="914400" y="1371600"/>
-            <a:ext cx="8229600" cy="4937760"/>
-          </a:xfrm>
-          <a:prstGeom prst="rect">
-            <a:avLst/>
-          </a:prstGeom>
-        </p:spPr>
-      </p:pic>
+        </p:nvGraphicFramePr>
+        <p:xfrm>
+          <a:off x="914400" y="1371600"/>
+          <a:ext cx="10058400" cy="3657600"/>
+        </p:xfrm>
+        <a:graphic>
+          <a:graphicData uri="http://schemas.openxmlformats.org/drawingml/2006/table">
+            <a:tbl>
+              <a:tblPr firstRow="1" bandRow="1">
+                <a:tableStyleId>{5C22544A-7EE6-4342-B048-85BDC9FD1C3A}</a:tableStyleId>
+              </a:tblPr>
+              <a:tblGrid>
+                <a:gridCol w="1436914"/>
+                <a:gridCol w="1436914"/>
+                <a:gridCol w="1436914"/>
+                <a:gridCol w="1436914"/>
+                <a:gridCol w="1436914"/>
+                <a:gridCol w="1436914"/>
+                <a:gridCol w="1436916"/>
+              </a:tblGrid>
+              <a:tr h="304800">
+                <a:tc>
+                  <a:txBody>
+                    <a:bodyPr/>
+                    <a:lstStyle/>
+                    <a:p>
+                      <a:pPr algn="ctr">
+                        <a:defRPr b="1"/>
+                      </a:pPr>
+                      <a:r>
+                        <a:t>age</a:t>
+                      </a:r>
+                    </a:p>
+                  </a:txBody>
+                  <a:tcPr>
+                    <a:solidFill>
+                      <a:srgbClr val="00B0F0"/>
+                    </a:solidFill>
+                  </a:tcPr>
+                </a:tc>
+                <a:tc>
+                  <a:txBody>
+                    <a:bodyPr/>
+                    <a:lstStyle/>
+                    <a:p>
+                      <a:pPr algn="ctr">
+                        <a:defRPr b="1"/>
+                      </a:pPr>
+                      <a:r>
+                        <a:t>sex</a:t>
+                      </a:r>
+                    </a:p>
+                  </a:txBody>
+                  <a:tcPr>
+                    <a:solidFill>
+                      <a:srgbClr val="00B0F0"/>
+                    </a:solidFill>
+                  </a:tcPr>
+                </a:tc>
+                <a:tc>
+                  <a:txBody>
+                    <a:bodyPr/>
+                    <a:lstStyle/>
+                    <a:p>
+                      <a:pPr algn="ctr">
+                        <a:defRPr b="1"/>
+                      </a:pPr>
+                      <a:r>
+                        <a:t>bmi</a:t>
+                      </a:r>
+                    </a:p>
+                  </a:txBody>
+                  <a:tcPr>
+                    <a:solidFill>
+                      <a:srgbClr val="00B0F0"/>
+                    </a:solidFill>
+                  </a:tcPr>
+                </a:tc>
+                <a:tc>
+                  <a:txBody>
+                    <a:bodyPr/>
+                    <a:lstStyle/>
+                    <a:p>
+                      <a:pPr algn="ctr">
+                        <a:defRPr b="1"/>
+                      </a:pPr>
+                      <a:r>
+                        <a:t>children</a:t>
+                      </a:r>
+                    </a:p>
+                  </a:txBody>
+                  <a:tcPr>
+                    <a:solidFill>
+                      <a:srgbClr val="00B0F0"/>
+                    </a:solidFill>
+                  </a:tcPr>
+                </a:tc>
+                <a:tc>
+                  <a:txBody>
+                    <a:bodyPr/>
+                    <a:lstStyle/>
+                    <a:p>
+                      <a:pPr algn="ctr">
+                        <a:defRPr b="1"/>
+                      </a:pPr>
+                      <a:r>
+                        <a:t>smoker</a:t>
+                      </a:r>
+                    </a:p>
+                  </a:txBody>
+                  <a:tcPr>
+                    <a:solidFill>
+                      <a:srgbClr val="00B0F0"/>
+                    </a:solidFill>
+                  </a:tcPr>
+                </a:tc>
+                <a:tc>
+                  <a:txBody>
+                    <a:bodyPr/>
+                    <a:lstStyle/>
+                    <a:p>
+                      <a:pPr algn="ctr">
+                        <a:defRPr b="1"/>
+                      </a:pPr>
+                      <a:r>
+                        <a:t>region</a:t>
+                      </a:r>
+                    </a:p>
+                  </a:txBody>
+                  <a:tcPr>
+                    <a:solidFill>
+                      <a:srgbClr val="00B0F0"/>
+                    </a:solidFill>
+                  </a:tcPr>
+                </a:tc>
+                <a:tc>
+                  <a:txBody>
+                    <a:bodyPr/>
+                    <a:lstStyle/>
+                    <a:p>
+                      <a:pPr algn="ctr">
+                        <a:defRPr b="1"/>
+                      </a:pPr>
+                      <a:r>
+                        <a:t>charges</a:t>
+                      </a:r>
+                    </a:p>
+                  </a:txBody>
+                  <a:tcPr>
+                    <a:solidFill>
+                      <a:srgbClr val="00B0F0"/>
+                    </a:solidFill>
+                  </a:tcPr>
+                </a:tc>
+              </a:tr>
+              <a:tr h="304800">
+                <a:tc>
+                  <a:txBody>
+                    <a:bodyPr/>
+                    <a:lstStyle/>
+                    <a:p>
+                      <a:pPr algn="l"/>
+                      <a:r>
+                        <a:t>count</a:t>
+                      </a:r>
+                    </a:p>
+                  </a:txBody>
+                  <a:tcPr>
+                    <a:solidFill>
+                      <a:srgbClr val="DCE6F1"/>
+                    </a:solidFill>
+                  </a:tcPr>
+                </a:tc>
+                <a:tc>
+                  <a:txBody>
+                    <a:bodyPr/>
+                    <a:lstStyle/>
+                    <a:p>
+                      <a:pPr algn="l"/>
+                      <a:r>
+                        <a:t>1338.000000</a:t>
+                      </a:r>
+                    </a:p>
+                  </a:txBody>
+                  <a:tcPr>
+                    <a:solidFill>
+                      <a:srgbClr val="DCE6F1"/>
+                    </a:solidFill>
+                  </a:tcPr>
+                </a:tc>
+                <a:tc>
+                  <a:txBody>
+                    <a:bodyPr/>
+                    <a:lstStyle/>
+                    <a:p>
+                      <a:pPr algn="l"/>
+                      <a:r>
+                        <a:t>1338</a:t>
+                      </a:r>
+                    </a:p>
+                  </a:txBody>
+                  <a:tcPr>
+                    <a:solidFill>
+                      <a:srgbClr val="DCE6F1"/>
+                    </a:solidFill>
+                  </a:tcPr>
+                </a:tc>
+                <a:tc>
+                  <a:txBody>
+                    <a:bodyPr/>
+                    <a:lstStyle/>
+                    <a:p>
+                      <a:pPr algn="l"/>
+                      <a:r>
+                        <a:t>1338.000000</a:t>
+                      </a:r>
+                    </a:p>
+                  </a:txBody>
+                  <a:tcPr>
+                    <a:solidFill>
+                      <a:srgbClr val="DCE6F1"/>
+                    </a:solidFill>
+                  </a:tcPr>
+                </a:tc>
+                <a:tc>
+                  <a:txBody>
+                    <a:bodyPr/>
+                    <a:lstStyle/>
+                    <a:p>
+                      <a:pPr algn="l"/>
+                      <a:r>
+                        <a:t>1338.000000</a:t>
+                      </a:r>
+                    </a:p>
+                  </a:txBody>
+                  <a:tcPr>
+                    <a:solidFill>
+                      <a:srgbClr val="DCE6F1"/>
+                    </a:solidFill>
+                  </a:tcPr>
+                </a:tc>
+                <a:tc>
+                  <a:txBody>
+                    <a:bodyPr/>
+                    <a:lstStyle/>
+                    <a:p>
+                      <a:pPr algn="l"/>
+                      <a:r>
+                        <a:t>1338</a:t>
+                      </a:r>
+                    </a:p>
+                  </a:txBody>
+                  <a:tcPr>
+                    <a:solidFill>
+                      <a:srgbClr val="DCE6F1"/>
+                    </a:solidFill>
+                  </a:tcPr>
+                </a:tc>
+                <a:tc>
+                  <a:txBody>
+                    <a:bodyPr/>
+                    <a:lstStyle/>
+                    <a:p>
+                      <a:pPr algn="l"/>
+                      <a:r>
+                        <a:t>1338</a:t>
+                      </a:r>
+                    </a:p>
+                  </a:txBody>
+                  <a:tcPr>
+                    <a:solidFill>
+                      <a:srgbClr val="DCE6F1"/>
+                    </a:solidFill>
+                  </a:tcPr>
+                </a:tc>
+              </a:tr>
+              <a:tr h="304800">
+                <a:tc>
+                  <a:txBody>
+                    <a:bodyPr/>
+                    <a:lstStyle/>
+                    <a:p>
+                      <a:pPr algn="l"/>
+                      <a:r>
+                        <a:t>unique</a:t>
+                      </a:r>
+                    </a:p>
+                  </a:txBody>
+                  <a:tcPr>
+                    <a:solidFill>
+                      <a:srgbClr val="FFFFFF"/>
+                    </a:solidFill>
+                  </a:tcPr>
+                </a:tc>
+                <a:tc>
+                  <a:txBody>
+                    <a:bodyPr/>
+                    <a:lstStyle/>
+                    <a:p>
+                      <a:pPr algn="l"/>
+                      <a:r>
+                        <a:t>NaN</a:t>
+                      </a:r>
+                    </a:p>
+                  </a:txBody>
+                  <a:tcPr>
+                    <a:solidFill>
+                      <a:srgbClr val="FFFFFF"/>
+                    </a:solidFill>
+                  </a:tcPr>
+                </a:tc>
+                <a:tc>
+                  <a:txBody>
+                    <a:bodyPr/>
+                    <a:lstStyle/>
+                    <a:p>
+                      <a:pPr algn="l"/>
+                      <a:r>
+                        <a:t>2</a:t>
+                      </a:r>
+                    </a:p>
+                  </a:txBody>
+                  <a:tcPr>
+                    <a:solidFill>
+                      <a:srgbClr val="FFFFFF"/>
+                    </a:solidFill>
+                  </a:tcPr>
+                </a:tc>
+                <a:tc>
+                  <a:txBody>
+                    <a:bodyPr/>
+                    <a:lstStyle/>
+                    <a:p>
+                      <a:pPr algn="l"/>
+                      <a:r>
+                        <a:t>NaN</a:t>
+                      </a:r>
+                    </a:p>
+                  </a:txBody>
+                  <a:tcPr>
+                    <a:solidFill>
+                      <a:srgbClr val="FFFFFF"/>
+                    </a:solidFill>
+                  </a:tcPr>
+                </a:tc>
+                <a:tc>
+                  <a:txBody>
+                    <a:bodyPr/>
+                    <a:lstStyle/>
+                    <a:p>
+                      <a:pPr algn="l"/>
+                      <a:r>
+                        <a:t>NaN</a:t>
+                      </a:r>
+                    </a:p>
+                  </a:txBody>
+                  <a:tcPr>
+                    <a:solidFill>
+                      <a:srgbClr val="FFFFFF"/>
+                    </a:solidFill>
+                  </a:tcPr>
+                </a:tc>
+                <a:tc>
+                  <a:txBody>
+                    <a:bodyPr/>
+                    <a:lstStyle/>
+                    <a:p>
+                      <a:pPr algn="l"/>
+                      <a:r>
+                        <a:t>2</a:t>
+                      </a:r>
+                    </a:p>
+                  </a:txBody>
+                  <a:tcPr>
+                    <a:solidFill>
+                      <a:srgbClr val="FFFFFF"/>
+                    </a:solidFill>
+                  </a:tcPr>
+                </a:tc>
+                <a:tc>
+                  <a:txBody>
+                    <a:bodyPr/>
+                    <a:lstStyle/>
+                    <a:p>
+                      <a:pPr algn="l"/>
+                      <a:r>
+                        <a:t>4</a:t>
+                      </a:r>
+                    </a:p>
+                  </a:txBody>
+                  <a:tcPr>
+                    <a:solidFill>
+                      <a:srgbClr val="FFFFFF"/>
+                    </a:solidFill>
+                  </a:tcPr>
+                </a:tc>
+              </a:tr>
+              <a:tr h="304800">
+                <a:tc>
+                  <a:txBody>
+                    <a:bodyPr/>
+                    <a:lstStyle/>
+                    <a:p>
+                      <a:pPr algn="l"/>
+                      <a:r>
+                        <a:t>top</a:t>
+                      </a:r>
+                    </a:p>
+                  </a:txBody>
+                  <a:tcPr>
+                    <a:solidFill>
+                      <a:srgbClr val="DCE6F1"/>
+                    </a:solidFill>
+                  </a:tcPr>
+                </a:tc>
+                <a:tc>
+                  <a:txBody>
+                    <a:bodyPr/>
+                    <a:lstStyle/>
+                    <a:p>
+                      <a:pPr algn="l"/>
+                      <a:r>
+                        <a:t>NaN</a:t>
+                      </a:r>
+                    </a:p>
+                  </a:txBody>
+                  <a:tcPr>
+                    <a:solidFill>
+                      <a:srgbClr val="DCE6F1"/>
+                    </a:solidFill>
+                  </a:tcPr>
+                </a:tc>
+                <a:tc>
+                  <a:txBody>
+                    <a:bodyPr/>
+                    <a:lstStyle/>
+                    <a:p>
+                      <a:pPr algn="l"/>
+                      <a:r>
+                        <a:t>male</a:t>
+                      </a:r>
+                    </a:p>
+                  </a:txBody>
+                  <a:tcPr>
+                    <a:solidFill>
+                      <a:srgbClr val="DCE6F1"/>
+                    </a:solidFill>
+                  </a:tcPr>
+                </a:tc>
+                <a:tc>
+                  <a:txBody>
+                    <a:bodyPr/>
+                    <a:lstStyle/>
+                    <a:p>
+                      <a:pPr algn="l"/>
+                      <a:r>
+                        <a:t>NaN</a:t>
+                      </a:r>
+                    </a:p>
+                  </a:txBody>
+                  <a:tcPr>
+                    <a:solidFill>
+                      <a:srgbClr val="DCE6F1"/>
+                    </a:solidFill>
+                  </a:tcPr>
+                </a:tc>
+                <a:tc>
+                  <a:txBody>
+                    <a:bodyPr/>
+                    <a:lstStyle/>
+                    <a:p>
+                      <a:pPr algn="l"/>
+                      <a:r>
+                        <a:t>NaN</a:t>
+                      </a:r>
+                    </a:p>
+                  </a:txBody>
+                  <a:tcPr>
+                    <a:solidFill>
+                      <a:srgbClr val="DCE6F1"/>
+                    </a:solidFill>
+                  </a:tcPr>
+                </a:tc>
+                <a:tc>
+                  <a:txBody>
+                    <a:bodyPr/>
+                    <a:lstStyle/>
+                    <a:p>
+                      <a:pPr algn="l"/>
+                      <a:r>
+                        <a:t>no</a:t>
+                      </a:r>
+                    </a:p>
+                  </a:txBody>
+                  <a:tcPr>
+                    <a:solidFill>
+                      <a:srgbClr val="DCE6F1"/>
+                    </a:solidFill>
+                  </a:tcPr>
+                </a:tc>
+                <a:tc>
+                  <a:txBody>
+                    <a:bodyPr/>
+                    <a:lstStyle/>
+                    <a:p>
+                      <a:pPr algn="l"/>
+                      <a:r>
+                        <a:t>southeast</a:t>
+                      </a:r>
+                    </a:p>
+                  </a:txBody>
+                  <a:tcPr>
+                    <a:solidFill>
+                      <a:srgbClr val="DCE6F1"/>
+                    </a:solidFill>
+                  </a:tcPr>
+                </a:tc>
+              </a:tr>
+              <a:tr h="304800">
+                <a:tc>
+                  <a:txBody>
+                    <a:bodyPr/>
+                    <a:lstStyle/>
+                    <a:p>
+                      <a:pPr algn="l"/>
+                      <a:r>
+                        <a:t>freq</a:t>
+                      </a:r>
+                    </a:p>
+                  </a:txBody>
+                  <a:tcPr>
+                    <a:solidFill>
+                      <a:srgbClr val="FFFFFF"/>
+                    </a:solidFill>
+                  </a:tcPr>
+                </a:tc>
+                <a:tc>
+                  <a:txBody>
+                    <a:bodyPr/>
+                    <a:lstStyle/>
+                    <a:p>
+                      <a:pPr algn="l"/>
+                      <a:r>
+                        <a:t>NaN</a:t>
+                      </a:r>
+                    </a:p>
+                  </a:txBody>
+                  <a:tcPr>
+                    <a:solidFill>
+                      <a:srgbClr val="FFFFFF"/>
+                    </a:solidFill>
+                  </a:tcPr>
+                </a:tc>
+                <a:tc>
+                  <a:txBody>
+                    <a:bodyPr/>
+                    <a:lstStyle/>
+                    <a:p>
+                      <a:pPr algn="l"/>
+                      <a:r>
+                        <a:t>676</a:t>
+                      </a:r>
+                    </a:p>
+                  </a:txBody>
+                  <a:tcPr>
+                    <a:solidFill>
+                      <a:srgbClr val="FFFFFF"/>
+                    </a:solidFill>
+                  </a:tcPr>
+                </a:tc>
+                <a:tc>
+                  <a:txBody>
+                    <a:bodyPr/>
+                    <a:lstStyle/>
+                    <a:p>
+                      <a:pPr algn="l"/>
+                      <a:r>
+                        <a:t>NaN</a:t>
+                      </a:r>
+                    </a:p>
+                  </a:txBody>
+                  <a:tcPr>
+                    <a:solidFill>
+                      <a:srgbClr val="FFFFFF"/>
+                    </a:solidFill>
+                  </a:tcPr>
+                </a:tc>
+                <a:tc>
+                  <a:txBody>
+                    <a:bodyPr/>
+                    <a:lstStyle/>
+                    <a:p>
+                      <a:pPr algn="l"/>
+                      <a:r>
+                        <a:t>NaN</a:t>
+                      </a:r>
+                    </a:p>
+                  </a:txBody>
+                  <a:tcPr>
+                    <a:solidFill>
+                      <a:srgbClr val="FFFFFF"/>
+                    </a:solidFill>
+                  </a:tcPr>
+                </a:tc>
+                <a:tc>
+                  <a:txBody>
+                    <a:bodyPr/>
+                    <a:lstStyle/>
+                    <a:p>
+                      <a:pPr algn="l"/>
+                      <a:r>
+                        <a:t>1064</a:t>
+                      </a:r>
+                    </a:p>
+                  </a:txBody>
+                  <a:tcPr>
+                    <a:solidFill>
+                      <a:srgbClr val="FFFFFF"/>
+                    </a:solidFill>
+                  </a:tcPr>
+                </a:tc>
+                <a:tc>
+                  <a:txBody>
+                    <a:bodyPr/>
+                    <a:lstStyle/>
+                    <a:p>
+                      <a:pPr algn="l"/>
+                      <a:r>
+                        <a:t>364</a:t>
+                      </a:r>
+                    </a:p>
+                  </a:txBody>
+                  <a:tcPr>
+                    <a:solidFill>
+                      <a:srgbClr val="FFFFFF"/>
+                    </a:solidFill>
+                  </a:tcPr>
+                </a:tc>
+              </a:tr>
+              <a:tr h="304800">
+                <a:tc>
+                  <a:txBody>
+                    <a:bodyPr/>
+                    <a:lstStyle/>
+                    <a:p>
+                      <a:pPr algn="l"/>
+                      <a:r>
+                        <a:t>mean</a:t>
+                      </a:r>
+                    </a:p>
+                  </a:txBody>
+                  <a:tcPr>
+                    <a:solidFill>
+                      <a:srgbClr val="DCE6F1"/>
+                    </a:solidFill>
+                  </a:tcPr>
+                </a:tc>
+                <a:tc>
+                  <a:txBody>
+                    <a:bodyPr/>
+                    <a:lstStyle/>
+                    <a:p>
+                      <a:pPr algn="l"/>
+                      <a:r>
+                        <a:t>39.207025</a:t>
+                      </a:r>
+                    </a:p>
+                  </a:txBody>
+                  <a:tcPr>
+                    <a:solidFill>
+                      <a:srgbClr val="DCE6F1"/>
+                    </a:solidFill>
+                  </a:tcPr>
+                </a:tc>
+                <a:tc>
+                  <a:txBody>
+                    <a:bodyPr/>
+                    <a:lstStyle/>
+                    <a:p>
+                      <a:pPr algn="l"/>
+                      <a:r>
+                        <a:t>NaN</a:t>
+                      </a:r>
+                    </a:p>
+                  </a:txBody>
+                  <a:tcPr>
+                    <a:solidFill>
+                      <a:srgbClr val="DCE6F1"/>
+                    </a:solidFill>
+                  </a:tcPr>
+                </a:tc>
+                <a:tc>
+                  <a:txBody>
+                    <a:bodyPr/>
+                    <a:lstStyle/>
+                    <a:p>
+                      <a:pPr algn="l"/>
+                      <a:r>
+                        <a:t>30.663397</a:t>
+                      </a:r>
+                    </a:p>
+                  </a:txBody>
+                  <a:tcPr>
+                    <a:solidFill>
+                      <a:srgbClr val="DCE6F1"/>
+                    </a:solidFill>
+                  </a:tcPr>
+                </a:tc>
+                <a:tc>
+                  <a:txBody>
+                    <a:bodyPr/>
+                    <a:lstStyle/>
+                    <a:p>
+                      <a:pPr algn="l"/>
+                      <a:r>
+                        <a:t>1.094918</a:t>
+                      </a:r>
+                    </a:p>
+                  </a:txBody>
+                  <a:tcPr>
+                    <a:solidFill>
+                      <a:srgbClr val="DCE6F1"/>
+                    </a:solidFill>
+                  </a:tcPr>
+                </a:tc>
+                <a:tc>
+                  <a:txBody>
+                    <a:bodyPr/>
+                    <a:lstStyle/>
+                    <a:p>
+                      <a:pPr algn="l"/>
+                      <a:r>
+                        <a:t>NaN</a:t>
+                      </a:r>
+                    </a:p>
+                  </a:txBody>
+                  <a:tcPr>
+                    <a:solidFill>
+                      <a:srgbClr val="DCE6F1"/>
+                    </a:solidFill>
+                  </a:tcPr>
+                </a:tc>
+                <a:tc>
+                  <a:txBody>
+                    <a:bodyPr/>
+                    <a:lstStyle/>
+                    <a:p>
+                      <a:pPr algn="l"/>
+                      <a:r>
+                        <a:t>NaN</a:t>
+                      </a:r>
+                    </a:p>
+                  </a:txBody>
+                  <a:tcPr>
+                    <a:solidFill>
+                      <a:srgbClr val="DCE6F1"/>
+                    </a:solidFill>
+                  </a:tcPr>
+                </a:tc>
+              </a:tr>
+              <a:tr h="304800">
+                <a:tc>
+                  <a:txBody>
+                    <a:bodyPr/>
+                    <a:lstStyle/>
+                    <a:p>
+                      <a:pPr algn="l"/>
+                      <a:r>
+                        <a:t>std</a:t>
+                      </a:r>
+                    </a:p>
+                  </a:txBody>
+                  <a:tcPr>
+                    <a:solidFill>
+                      <a:srgbClr val="FFFFFF"/>
+                    </a:solidFill>
+                  </a:tcPr>
+                </a:tc>
+                <a:tc>
+                  <a:txBody>
+                    <a:bodyPr/>
+                    <a:lstStyle/>
+                    <a:p>
+                      <a:pPr algn="l"/>
+                      <a:r>
+                        <a:t>14.049960</a:t>
+                      </a:r>
+                    </a:p>
+                  </a:txBody>
+                  <a:tcPr>
+                    <a:solidFill>
+                      <a:srgbClr val="FFFFFF"/>
+                    </a:solidFill>
+                  </a:tcPr>
+                </a:tc>
+                <a:tc>
+                  <a:txBody>
+                    <a:bodyPr/>
+                    <a:lstStyle/>
+                    <a:p>
+                      <a:pPr algn="l"/>
+                      <a:r>
+                        <a:t>NaN</a:t>
+                      </a:r>
+                    </a:p>
+                  </a:txBody>
+                  <a:tcPr>
+                    <a:solidFill>
+                      <a:srgbClr val="FFFFFF"/>
+                    </a:solidFill>
+                  </a:tcPr>
+                </a:tc>
+                <a:tc>
+                  <a:txBody>
+                    <a:bodyPr/>
+                    <a:lstStyle/>
+                    <a:p>
+                      <a:pPr algn="l"/>
+                      <a:r>
+                        <a:t>6.098187</a:t>
+                      </a:r>
+                    </a:p>
+                  </a:txBody>
+                  <a:tcPr>
+                    <a:solidFill>
+                      <a:srgbClr val="FFFFFF"/>
+                    </a:solidFill>
+                  </a:tcPr>
+                </a:tc>
+                <a:tc>
+                  <a:txBody>
+                    <a:bodyPr/>
+                    <a:lstStyle/>
+                    <a:p>
+                      <a:pPr algn="l"/>
+                      <a:r>
+                        <a:t>1.205493</a:t>
+                      </a:r>
+                    </a:p>
+                  </a:txBody>
+                  <a:tcPr>
+                    <a:solidFill>
+                      <a:srgbClr val="FFFFFF"/>
+                    </a:solidFill>
+                  </a:tcPr>
+                </a:tc>
+                <a:tc>
+                  <a:txBody>
+                    <a:bodyPr/>
+                    <a:lstStyle/>
+                    <a:p>
+                      <a:pPr algn="l"/>
+                      <a:r>
+                        <a:t>NaN</a:t>
+                      </a:r>
+                    </a:p>
+                  </a:txBody>
+                  <a:tcPr>
+                    <a:solidFill>
+                      <a:srgbClr val="FFFFFF"/>
+                    </a:solidFill>
+                  </a:tcPr>
+                </a:tc>
+                <a:tc>
+                  <a:txBody>
+                    <a:bodyPr/>
+                    <a:lstStyle/>
+                    <a:p>
+                      <a:pPr algn="l"/>
+                      <a:r>
+                        <a:t>NaN</a:t>
+                      </a:r>
+                    </a:p>
+                  </a:txBody>
+                  <a:tcPr>
+                    <a:solidFill>
+                      <a:srgbClr val="FFFFFF"/>
+                    </a:solidFill>
+                  </a:tcPr>
+                </a:tc>
+              </a:tr>
+              <a:tr h="304800">
+                <a:tc>
+                  <a:txBody>
+                    <a:bodyPr/>
+                    <a:lstStyle/>
+                    <a:p>
+                      <a:pPr algn="l"/>
+                      <a:r>
+                        <a:t>min</a:t>
+                      </a:r>
+                    </a:p>
+                  </a:txBody>
+                  <a:tcPr>
+                    <a:solidFill>
+                      <a:srgbClr val="DCE6F1"/>
+                    </a:solidFill>
+                  </a:tcPr>
+                </a:tc>
+                <a:tc>
+                  <a:txBody>
+                    <a:bodyPr/>
+                    <a:lstStyle/>
+                    <a:p>
+                      <a:pPr algn="l"/>
+                      <a:r>
+                        <a:t>18.000000</a:t>
+                      </a:r>
+                    </a:p>
+                  </a:txBody>
+                  <a:tcPr>
+                    <a:solidFill>
+                      <a:srgbClr val="DCE6F1"/>
+                    </a:solidFill>
+                  </a:tcPr>
+                </a:tc>
+                <a:tc>
+                  <a:txBody>
+                    <a:bodyPr/>
+                    <a:lstStyle/>
+                    <a:p>
+                      <a:pPr algn="l"/>
+                      <a:r>
+                        <a:t>NaN</a:t>
+                      </a:r>
+                    </a:p>
+                  </a:txBody>
+                  <a:tcPr>
+                    <a:solidFill>
+                      <a:srgbClr val="DCE6F1"/>
+                    </a:solidFill>
+                  </a:tcPr>
+                </a:tc>
+                <a:tc>
+                  <a:txBody>
+                    <a:bodyPr/>
+                    <a:lstStyle/>
+                    <a:p>
+                      <a:pPr algn="l"/>
+                      <a:r>
+                        <a:t>15.960000</a:t>
+                      </a:r>
+                    </a:p>
+                  </a:txBody>
+                  <a:tcPr>
+                    <a:solidFill>
+                      <a:srgbClr val="DCE6F1"/>
+                    </a:solidFill>
+                  </a:tcPr>
+                </a:tc>
+                <a:tc>
+                  <a:txBody>
+                    <a:bodyPr/>
+                    <a:lstStyle/>
+                    <a:p>
+                      <a:pPr algn="l"/>
+                      <a:r>
+                        <a:t>0.000000</a:t>
+                      </a:r>
+                    </a:p>
+                  </a:txBody>
+                  <a:tcPr>
+                    <a:solidFill>
+                      <a:srgbClr val="DCE6F1"/>
+                    </a:solidFill>
+                  </a:tcPr>
+                </a:tc>
+                <a:tc>
+                  <a:txBody>
+                    <a:bodyPr/>
+                    <a:lstStyle/>
+                    <a:p>
+                      <a:pPr algn="l"/>
+                      <a:r>
+                        <a:t>NaN</a:t>
+                      </a:r>
+                    </a:p>
+                  </a:txBody>
+                  <a:tcPr>
+                    <a:solidFill>
+                      <a:srgbClr val="DCE6F1"/>
+                    </a:solidFill>
+                  </a:tcPr>
+                </a:tc>
+                <a:tc>
+                  <a:txBody>
+                    <a:bodyPr/>
+                    <a:lstStyle/>
+                    <a:p>
+                      <a:pPr algn="l"/>
+                      <a:r>
+                        <a:t>NaN</a:t>
+                      </a:r>
+                    </a:p>
+                  </a:txBody>
+                  <a:tcPr>
+                    <a:solidFill>
+                      <a:srgbClr val="DCE6F1"/>
+                    </a:solidFill>
+                  </a:tcPr>
+                </a:tc>
+              </a:tr>
+              <a:tr h="304800">
+                <a:tc>
+                  <a:txBody>
+                    <a:bodyPr/>
+                    <a:lstStyle/>
+                    <a:p>
+                      <a:pPr algn="l"/>
+                      <a:r>
+                        <a:t>25%</a:t>
+                      </a:r>
+                    </a:p>
+                  </a:txBody>
+                  <a:tcPr>
+                    <a:solidFill>
+                      <a:srgbClr val="FFFFFF"/>
+                    </a:solidFill>
+                  </a:tcPr>
+                </a:tc>
+                <a:tc>
+                  <a:txBody>
+                    <a:bodyPr/>
+                    <a:lstStyle/>
+                    <a:p>
+                      <a:pPr algn="l"/>
+                      <a:r>
+                        <a:t>27.000000</a:t>
+                      </a:r>
+                    </a:p>
+                  </a:txBody>
+                  <a:tcPr>
+                    <a:solidFill>
+                      <a:srgbClr val="FFFFFF"/>
+                    </a:solidFill>
+                  </a:tcPr>
+                </a:tc>
+                <a:tc>
+                  <a:txBody>
+                    <a:bodyPr/>
+                    <a:lstStyle/>
+                    <a:p>
+                      <a:pPr algn="l"/>
+                      <a:r>
+                        <a:t>NaN</a:t>
+                      </a:r>
+                    </a:p>
+                  </a:txBody>
+                  <a:tcPr>
+                    <a:solidFill>
+                      <a:srgbClr val="FFFFFF"/>
+                    </a:solidFill>
+                  </a:tcPr>
+                </a:tc>
+                <a:tc>
+                  <a:txBody>
+                    <a:bodyPr/>
+                    <a:lstStyle/>
+                    <a:p>
+                      <a:pPr algn="l"/>
+                      <a:r>
+                        <a:t>26.296250</a:t>
+                      </a:r>
+                    </a:p>
+                  </a:txBody>
+                  <a:tcPr>
+                    <a:solidFill>
+                      <a:srgbClr val="FFFFFF"/>
+                    </a:solidFill>
+                  </a:tcPr>
+                </a:tc>
+                <a:tc>
+                  <a:txBody>
+                    <a:bodyPr/>
+                    <a:lstStyle/>
+                    <a:p>
+                      <a:pPr algn="l"/>
+                      <a:r>
+                        <a:t>0.000000</a:t>
+                      </a:r>
+                    </a:p>
+                  </a:txBody>
+                  <a:tcPr>
+                    <a:solidFill>
+                      <a:srgbClr val="FFFFFF"/>
+                    </a:solidFill>
+                  </a:tcPr>
+                </a:tc>
+                <a:tc>
+                  <a:txBody>
+                    <a:bodyPr/>
+                    <a:lstStyle/>
+                    <a:p>
+                      <a:pPr algn="l"/>
+                      <a:r>
+                        <a:t>NaN</a:t>
+                      </a:r>
+                    </a:p>
+                  </a:txBody>
+                  <a:tcPr>
+                    <a:solidFill>
+                      <a:srgbClr val="FFFFFF"/>
+                    </a:solidFill>
+                  </a:tcPr>
+                </a:tc>
+                <a:tc>
+                  <a:txBody>
+                    <a:bodyPr/>
+                    <a:lstStyle/>
+                    <a:p>
+                      <a:pPr algn="l"/>
+                      <a:r>
+                        <a:t>NaN</a:t>
+                      </a:r>
+                    </a:p>
+                  </a:txBody>
+                  <a:tcPr>
+                    <a:solidFill>
+                      <a:srgbClr val="FFFFFF"/>
+                    </a:solidFill>
+                  </a:tcPr>
+                </a:tc>
+              </a:tr>
+              <a:tr h="304800">
+                <a:tc>
+                  <a:txBody>
+                    <a:bodyPr/>
+                    <a:lstStyle/>
+                    <a:p>
+                      <a:pPr algn="l"/>
+                      <a:r>
+                        <a:t>50%</a:t>
+                      </a:r>
+                    </a:p>
+                  </a:txBody>
+                  <a:tcPr>
+                    <a:solidFill>
+                      <a:srgbClr val="DCE6F1"/>
+                    </a:solidFill>
+                  </a:tcPr>
+                </a:tc>
+                <a:tc>
+                  <a:txBody>
+                    <a:bodyPr/>
+                    <a:lstStyle/>
+                    <a:p>
+                      <a:pPr algn="l"/>
+                      <a:r>
+                        <a:t>39.000000</a:t>
+                      </a:r>
+                    </a:p>
+                  </a:txBody>
+                  <a:tcPr>
+                    <a:solidFill>
+                      <a:srgbClr val="DCE6F1"/>
+                    </a:solidFill>
+                  </a:tcPr>
+                </a:tc>
+                <a:tc>
+                  <a:txBody>
+                    <a:bodyPr/>
+                    <a:lstStyle/>
+                    <a:p>
+                      <a:pPr algn="l"/>
+                      <a:r>
+                        <a:t>NaN</a:t>
+                      </a:r>
+                    </a:p>
+                  </a:txBody>
+                  <a:tcPr>
+                    <a:solidFill>
+                      <a:srgbClr val="DCE6F1"/>
+                    </a:solidFill>
+                  </a:tcPr>
+                </a:tc>
+                <a:tc>
+                  <a:txBody>
+                    <a:bodyPr/>
+                    <a:lstStyle/>
+                    <a:p>
+                      <a:pPr algn="l"/>
+                      <a:r>
+                        <a:t>30.400000</a:t>
+                      </a:r>
+                    </a:p>
+                  </a:txBody>
+                  <a:tcPr>
+                    <a:solidFill>
+                      <a:srgbClr val="DCE6F1"/>
+                    </a:solidFill>
+                  </a:tcPr>
+                </a:tc>
+                <a:tc>
+                  <a:txBody>
+                    <a:bodyPr/>
+                    <a:lstStyle/>
+                    <a:p>
+                      <a:pPr algn="l"/>
+                      <a:r>
+                        <a:t>1.000000</a:t>
+                      </a:r>
+                    </a:p>
+                  </a:txBody>
+                  <a:tcPr>
+                    <a:solidFill>
+                      <a:srgbClr val="DCE6F1"/>
+                    </a:solidFill>
+                  </a:tcPr>
+                </a:tc>
+                <a:tc>
+                  <a:txBody>
+                    <a:bodyPr/>
+                    <a:lstStyle/>
+                    <a:p>
+                      <a:pPr algn="l"/>
+                      <a:r>
+                        <a:t>NaN</a:t>
+                      </a:r>
+                    </a:p>
+                  </a:txBody>
+                  <a:tcPr>
+                    <a:solidFill>
+                      <a:srgbClr val="DCE6F1"/>
+                    </a:solidFill>
+                  </a:tcPr>
+                </a:tc>
+                <a:tc>
+                  <a:txBody>
+                    <a:bodyPr/>
+                    <a:lstStyle/>
+                    <a:p>
+                      <a:pPr algn="l"/>
+                      <a:r>
+                        <a:t>NaN</a:t>
+                      </a:r>
+                    </a:p>
+                  </a:txBody>
+                  <a:tcPr>
+                    <a:solidFill>
+                      <a:srgbClr val="DCE6F1"/>
+                    </a:solidFill>
+                  </a:tcPr>
+                </a:tc>
+              </a:tr>
+              <a:tr h="304800">
+                <a:tc>
+                  <a:txBody>
+                    <a:bodyPr/>
+                    <a:lstStyle/>
+                    <a:p>
+                      <a:pPr algn="l"/>
+                      <a:r>
+                        <a:t>75%</a:t>
+                      </a:r>
+                    </a:p>
+                  </a:txBody>
+                  <a:tcPr>
+                    <a:solidFill>
+                      <a:srgbClr val="FFFFFF"/>
+                    </a:solidFill>
+                  </a:tcPr>
+                </a:tc>
+                <a:tc>
+                  <a:txBody>
+                    <a:bodyPr/>
+                    <a:lstStyle/>
+                    <a:p>
+                      <a:pPr algn="l"/>
+                      <a:r>
+                        <a:t>51.000000</a:t>
+                      </a:r>
+                    </a:p>
+                  </a:txBody>
+                  <a:tcPr>
+                    <a:solidFill>
+                      <a:srgbClr val="FFFFFF"/>
+                    </a:solidFill>
+                  </a:tcPr>
+                </a:tc>
+                <a:tc>
+                  <a:txBody>
+                    <a:bodyPr/>
+                    <a:lstStyle/>
+                    <a:p>
+                      <a:pPr algn="l"/>
+                      <a:r>
+                        <a:t>NaN</a:t>
+                      </a:r>
+                    </a:p>
+                  </a:txBody>
+                  <a:tcPr>
+                    <a:solidFill>
+                      <a:srgbClr val="FFFFFF"/>
+                    </a:solidFill>
+                  </a:tcPr>
+                </a:tc>
+                <a:tc>
+                  <a:txBody>
+                    <a:bodyPr/>
+                    <a:lstStyle/>
+                    <a:p>
+                      <a:pPr algn="l"/>
+                      <a:r>
+                        <a:t>34.693750</a:t>
+                      </a:r>
+                    </a:p>
+                  </a:txBody>
+                  <a:tcPr>
+                    <a:solidFill>
+                      <a:srgbClr val="FFFFFF"/>
+                    </a:solidFill>
+                  </a:tcPr>
+                </a:tc>
+                <a:tc>
+                  <a:txBody>
+                    <a:bodyPr/>
+                    <a:lstStyle/>
+                    <a:p>
+                      <a:pPr algn="l"/>
+                      <a:r>
+                        <a:t>2.000000</a:t>
+                      </a:r>
+                    </a:p>
+                  </a:txBody>
+                  <a:tcPr>
+                    <a:solidFill>
+                      <a:srgbClr val="FFFFFF"/>
+                    </a:solidFill>
+                  </a:tcPr>
+                </a:tc>
+                <a:tc>
+                  <a:txBody>
+                    <a:bodyPr/>
+                    <a:lstStyle/>
+                    <a:p>
+                      <a:pPr algn="l"/>
+                      <a:r>
+                        <a:t>NaN</a:t>
+                      </a:r>
+                    </a:p>
+                  </a:txBody>
+                  <a:tcPr>
+                    <a:solidFill>
+                      <a:srgbClr val="FFFFFF"/>
+                    </a:solidFill>
+                  </a:tcPr>
+                </a:tc>
+                <a:tc>
+                  <a:txBody>
+                    <a:bodyPr/>
+                    <a:lstStyle/>
+                    <a:p>
+                      <a:pPr algn="l"/>
+                      <a:r>
+                        <a:t>NaN</a:t>
+                      </a:r>
+                    </a:p>
+                  </a:txBody>
+                  <a:tcPr>
+                    <a:solidFill>
+                      <a:srgbClr val="FFFFFF"/>
+                    </a:solidFill>
+                  </a:tcPr>
+                </a:tc>
+              </a:tr>
+              <a:tr h="304800">
+                <a:tc>
+                  <a:txBody>
+                    <a:bodyPr/>
+                    <a:lstStyle/>
+                    <a:p>
+                      <a:pPr algn="l"/>
+                      <a:r>
+                        <a:t>max</a:t>
+                      </a:r>
+                    </a:p>
+                  </a:txBody>
+                  <a:tcPr>
+                    <a:solidFill>
+                      <a:srgbClr val="DCE6F1"/>
+                    </a:solidFill>
+                  </a:tcPr>
+                </a:tc>
+                <a:tc>
+                  <a:txBody>
+                    <a:bodyPr/>
+                    <a:lstStyle/>
+                    <a:p>
+                      <a:pPr algn="l"/>
+                      <a:r>
+                        <a:t>64.000000</a:t>
+                      </a:r>
+                    </a:p>
+                  </a:txBody>
+                  <a:tcPr>
+                    <a:solidFill>
+                      <a:srgbClr val="DCE6F1"/>
+                    </a:solidFill>
+                  </a:tcPr>
+                </a:tc>
+                <a:tc>
+                  <a:txBody>
+                    <a:bodyPr/>
+                    <a:lstStyle/>
+                    <a:p>
+                      <a:pPr algn="l"/>
+                      <a:r>
+                        <a:t>NaN</a:t>
+                      </a:r>
+                    </a:p>
+                  </a:txBody>
+                  <a:tcPr>
+                    <a:solidFill>
+                      <a:srgbClr val="DCE6F1"/>
+                    </a:solidFill>
+                  </a:tcPr>
+                </a:tc>
+                <a:tc>
+                  <a:txBody>
+                    <a:bodyPr/>
+                    <a:lstStyle/>
+                    <a:p>
+                      <a:pPr algn="l"/>
+                      <a:r>
+                        <a:t>53.130000</a:t>
+                      </a:r>
+                    </a:p>
+                  </a:txBody>
+                  <a:tcPr>
+                    <a:solidFill>
+                      <a:srgbClr val="DCE6F1"/>
+                    </a:solidFill>
+                  </a:tcPr>
+                </a:tc>
+                <a:tc>
+                  <a:txBody>
+                    <a:bodyPr/>
+                    <a:lstStyle/>
+                    <a:p>
+                      <a:pPr algn="l"/>
+                      <a:r>
+                        <a:t>5.000000</a:t>
+                      </a:r>
+                    </a:p>
+                  </a:txBody>
+                  <a:tcPr>
+                    <a:solidFill>
+                      <a:srgbClr val="DCE6F1"/>
+                    </a:solidFill>
+                  </a:tcPr>
+                </a:tc>
+                <a:tc>
+                  <a:txBody>
+                    <a:bodyPr/>
+                    <a:lstStyle/>
+                    <a:p>
+                      <a:pPr algn="l"/>
+                      <a:r>
+                        <a:t>NaN</a:t>
+                      </a:r>
+                    </a:p>
+                  </a:txBody>
+                  <a:tcPr>
+                    <a:solidFill>
+                      <a:srgbClr val="DCE6F1"/>
+                    </a:solidFill>
+                  </a:tcPr>
+                </a:tc>
+                <a:tc>
+                  <a:txBody>
+                    <a:bodyPr/>
+                    <a:lstStyle/>
+                    <a:p>
+                      <a:pPr algn="l"/>
+                      <a:r>
+                        <a:t>NaN</a:t>
+                      </a:r>
+                    </a:p>
+                  </a:txBody>
+                  <a:tcPr>
+                    <a:solidFill>
+                      <a:srgbClr val="DCE6F1"/>
+                    </a:solidFill>
+                  </a:tcPr>
+                </a:tc>
+              </a:tr>
+            </a:tbl>
+          </a:graphicData>
+        </a:graphic>
+      </p:graphicFrame>
     </p:spTree>
   </p:cSld>
   <p:clrMapOvr>
@@ -3564,15 +5035,14 @@
           <a:lstStyle/>
           <a:p>
             <a:r>
-              <a:rPr b="1"/>
-              <a:t>CHART - BIVARIATE AGE VS BMI</a:t>
+              <a:t>Chart: bivariate_age_vs_charges.png</a:t>
             </a:r>
           </a:p>
         </p:txBody>
       </p:sp>
       <p:pic>
         <p:nvPicPr>
-          <p:cNvPr id="3" name="Picture 2" descr="bivariate_age_vs_bmi.png"/>
+          <p:cNvPr id="3" name="Picture 2" descr="bivariate_age_vs_charges.png"/>
           <p:cNvPicPr>
             <a:picLocks noChangeAspect="1"/>
           </p:cNvPicPr>
@@ -3586,8 +5056,8 @@
         </p:blipFill>
         <p:spPr>
           <a:xfrm>
-            <a:off x="914400" y="1371600"/>
-            <a:ext cx="8229600" cy="4937760"/>
+            <a:off x="457200" y="457200"/>
+            <a:ext cx="7620000" cy="4572000"/>
           </a:xfrm>
           <a:prstGeom prst="rect">
             <a:avLst/>
@@ -3628,15 +5098,14 @@
           <a:lstStyle/>
           <a:p>
             <a:r>
-              <a:rPr b="1"/>
-              <a:t>CHART - BIVARIATE AGE VS CHARGES</a:t>
+              <a:t>Chart: bivariate_age_vs_children.png</a:t>
             </a:r>
           </a:p>
         </p:txBody>
       </p:sp>
       <p:pic>
         <p:nvPicPr>
-          <p:cNvPr id="3" name="Picture 2" descr="bivariate_age_vs_charges.png"/>
+          <p:cNvPr id="3" name="Picture 2" descr="bivariate_age_vs_children.png"/>
           <p:cNvPicPr>
             <a:picLocks noChangeAspect="1"/>
           </p:cNvPicPr>
@@ -3650,8 +5119,8 @@
         </p:blipFill>
         <p:spPr>
           <a:xfrm>
-            <a:off x="914400" y="1371600"/>
-            <a:ext cx="8229600" cy="4937760"/>
+            <a:off x="457200" y="457200"/>
+            <a:ext cx="7620000" cy="4572000"/>
           </a:xfrm>
           <a:prstGeom prst="rect">
             <a:avLst/>
@@ -3692,15 +5161,14 @@
           <a:lstStyle/>
           <a:p>
             <a:r>
-              <a:rPr b="1"/>
-              <a:t>CHART - BIVARIATE AGE VS CHILDREN</a:t>
+              <a:t>Chart: bivariate_bmi_vs_charges.png</a:t>
             </a:r>
           </a:p>
         </p:txBody>
       </p:sp>
       <p:pic>
         <p:nvPicPr>
-          <p:cNvPr id="3" name="Picture 2" descr="bivariate_age_vs_children.png"/>
+          <p:cNvPr id="3" name="Picture 2" descr="bivariate_bmi_vs_charges.png"/>
           <p:cNvPicPr>
             <a:picLocks noChangeAspect="1"/>
           </p:cNvPicPr>
@@ -3714,8 +5182,8 @@
         </p:blipFill>
         <p:spPr>
           <a:xfrm>
-            <a:off x="914400" y="1371600"/>
-            <a:ext cx="8229600" cy="4937760"/>
+            <a:off x="457200" y="457200"/>
+            <a:ext cx="7620000" cy="4572000"/>
           </a:xfrm>
           <a:prstGeom prst="rect">
             <a:avLst/>
@@ -3756,15 +5224,14 @@
           <a:lstStyle/>
           <a:p>
             <a:r>
-              <a:rPr b="1"/>
-              <a:t>CHART - BIVARIATE BMI VS CHARGES</a:t>
+              <a:t>Chart: bivariate_bmi_vs_children.png</a:t>
             </a:r>
           </a:p>
         </p:txBody>
       </p:sp>
       <p:pic>
         <p:nvPicPr>
-          <p:cNvPr id="3" name="Picture 2" descr="bivariate_bmi_vs_charges.png"/>
+          <p:cNvPr id="3" name="Picture 2" descr="bivariate_bmi_vs_children.png"/>
           <p:cNvPicPr>
             <a:picLocks noChangeAspect="1"/>
           </p:cNvPicPr>
@@ -3778,8 +5245,8 @@
         </p:blipFill>
         <p:spPr>
           <a:xfrm>
-            <a:off x="914400" y="1371600"/>
-            <a:ext cx="8229600" cy="4937760"/>
+            <a:off x="457200" y="457200"/>
+            <a:ext cx="7620000" cy="4572000"/>
           </a:xfrm>
           <a:prstGeom prst="rect">
             <a:avLst/>
@@ -3820,15 +5287,14 @@
           <a:lstStyle/>
           <a:p>
             <a:r>
-              <a:rPr b="1"/>
-              <a:t>CHART - BIVARIATE BMI VS CHILDREN</a:t>
+              <a:t>Chart: bivariate_children_vs_charges.png</a:t>
             </a:r>
           </a:p>
         </p:txBody>
       </p:sp>
       <p:pic>
         <p:nvPicPr>
-          <p:cNvPr id="3" name="Picture 2" descr="bivariate_bmi_vs_children.png"/>
+          <p:cNvPr id="3" name="Picture 2" descr="bivariate_children_vs_charges.png"/>
           <p:cNvPicPr>
             <a:picLocks noChangeAspect="1"/>
           </p:cNvPicPr>
@@ -3842,8 +5308,8 @@
         </p:blipFill>
         <p:spPr>
           <a:xfrm>
-            <a:off x="914400" y="1371600"/>
-            <a:ext cx="8229600" cy="4937760"/>
+            <a:off x="457200" y="457200"/>
+            <a:ext cx="7620000" cy="4572000"/>
           </a:xfrm>
           <a:prstGeom prst="rect">
             <a:avLst/>
@@ -3884,15 +5350,14 @@
           <a:lstStyle/>
           <a:p>
             <a:r>
-              <a:rPr b="1"/>
-              <a:t>CHART - BIVARIATE CHILDREN VS CHARGES</a:t>
+              <a:t>Chart: correlation_matrix.png</a:t>
             </a:r>
           </a:p>
         </p:txBody>
       </p:sp>
       <p:pic>
         <p:nvPicPr>
-          <p:cNvPr id="3" name="Picture 2" descr="bivariate_children_vs_charges.png"/>
+          <p:cNvPr id="3" name="Picture 2" descr="correlation_matrix.png"/>
           <p:cNvPicPr>
             <a:picLocks noChangeAspect="1"/>
           </p:cNvPicPr>
@@ -3906,8 +5371,8 @@
         </p:blipFill>
         <p:spPr>
           <a:xfrm>
-            <a:off x="914400" y="1371600"/>
-            <a:ext cx="8229600" cy="4937760"/>
+            <a:off x="457200" y="457200"/>
+            <a:ext cx="6858000" cy="4572000"/>
           </a:xfrm>
           <a:prstGeom prst="rect">
             <a:avLst/>
@@ -3948,15 +5413,14 @@
           <a:lstStyle/>
           <a:p>
             <a:r>
-              <a:rPr b="1"/>
-              <a:t>CHART - CORRELATION MATRIX</a:t>
+              <a:t>Chart: univariate_age.png</a:t>
             </a:r>
           </a:p>
         </p:txBody>
       </p:sp>
       <p:pic>
         <p:nvPicPr>
-          <p:cNvPr id="3" name="Picture 2" descr="correlation_matrix.png"/>
+          <p:cNvPr id="3" name="Picture 2" descr="univariate_age.png"/>
           <p:cNvPicPr>
             <a:picLocks noChangeAspect="1"/>
           </p:cNvPicPr>
@@ -3970,8 +5434,8 @@
         </p:blipFill>
         <p:spPr>
           <a:xfrm>
-            <a:off x="914400" y="1371600"/>
-            <a:ext cx="8229600" cy="5486400"/>
+            <a:off x="457200" y="457200"/>
+            <a:ext cx="7620000" cy="4572000"/>
           </a:xfrm>
           <a:prstGeom prst="rect">
             <a:avLst/>
@@ -4012,15 +5476,14 @@
           <a:lstStyle/>
           <a:p>
             <a:r>
-              <a:rPr b="1"/>
-              <a:t>CHART - UNIVARIATE AGE</a:t>
+              <a:t>Chart: univariate_bmi.png</a:t>
             </a:r>
           </a:p>
         </p:txBody>
       </p:sp>
       <p:pic>
         <p:nvPicPr>
-          <p:cNvPr id="3" name="Picture 2" descr="univariate_age.png"/>
+          <p:cNvPr id="3" name="Picture 2" descr="univariate_bmi.png"/>
           <p:cNvPicPr>
             <a:picLocks noChangeAspect="1"/>
           </p:cNvPicPr>
@@ -4034,8 +5497,8 @@
         </p:blipFill>
         <p:spPr>
           <a:xfrm>
-            <a:off x="914400" y="1371600"/>
-            <a:ext cx="8229600" cy="4937760"/>
+            <a:off x="457200" y="457200"/>
+            <a:ext cx="7620000" cy="4572000"/>
           </a:xfrm>
           <a:prstGeom prst="rect">
             <a:avLst/>

</xml_diff>